<commit_message>
Site updated: 2020-02-05 23:27:30
</commit_message>
<xml_diff>
--- a/images/Google-Chrome瀏覽器吃記憶體-電腦速度慢到炸-一鍵釋放記憶體空間，1秒提升電腦速度/新增 Microsoft PowerPoint 簡報.pptx
+++ b/images/Google-Chrome瀏覽器吃記憶體-電腦速度慢到炸-一鍵釋放記憶體空間，1秒提升電腦速度/新增 Microsoft PowerPoint 簡報.pptx
@@ -6,7 +6,8 @@
   </p:sldMasterIdLst>
   <p:sldIdLst>
     <p:sldId id="256" r:id="rId2"/>
-    <p:sldId id="257" r:id="rId3"/>
+    <p:sldId id="258" r:id="rId3"/>
+    <p:sldId id="257" r:id="rId4"/>
   </p:sldIdLst>
   <p:sldSz cx="9144000" cy="6858000" type="screen4x3"/>
   <p:notesSz cx="6858000" cy="9144000"/>
@@ -3132,6 +3133,102 @@
 </file>
 
 <file path=ppt/slides/slide2.xml><?xml version="1.0" encoding="utf-8"?>
+<p:sld xmlns:a="http://schemas.openxmlformats.org/drawingml/2006/main" xmlns:r="http://schemas.openxmlformats.org/officeDocument/2006/relationships" xmlns:p="http://schemas.openxmlformats.org/presentationml/2006/main">
+  <p:cSld>
+    <p:spTree>
+      <p:nvGrpSpPr>
+        <p:cNvPr id="1" name=""/>
+        <p:cNvGrpSpPr/>
+        <p:nvPr/>
+      </p:nvGrpSpPr>
+      <p:grpSpPr>
+        <a:xfrm>
+          <a:off x="0" y="0"/>
+          <a:ext cx="0" cy="0"/>
+          <a:chOff x="0" y="0"/>
+          <a:chExt cx="0" cy="0"/>
+        </a:xfrm>
+      </p:grpSpPr>
+      <p:pic>
+        <p:nvPicPr>
+          <p:cNvPr id="5" name="圖片 4"/>
+          <p:cNvPicPr>
+            <a:picLocks noChangeAspect="1"/>
+          </p:cNvPicPr>
+          <p:nvPr/>
+        </p:nvPicPr>
+        <p:blipFill>
+          <a:blip r:embed="rId2">
+            <a:extLst>
+              <a:ext uri="{28A0092B-C50C-407E-A947-70E740481C1C}">
+                <a14:useLocalDpi xmlns:a14="http://schemas.microsoft.com/office/drawing/2010/main" val="0"/>
+              </a:ext>
+            </a:extLst>
+          </a:blip>
+          <a:stretch>
+            <a:fillRect/>
+          </a:stretch>
+        </p:blipFill>
+        <p:spPr>
+          <a:xfrm>
+            <a:off x="0" y="706971"/>
+            <a:ext cx="9144000" cy="5444057"/>
+          </a:xfrm>
+          <a:prstGeom prst="rect">
+            <a:avLst/>
+          </a:prstGeom>
+        </p:spPr>
+      </p:pic>
+      <p:pic>
+        <p:nvPicPr>
+          <p:cNvPr id="6" name="圖片 5"/>
+          <p:cNvPicPr>
+            <a:picLocks noChangeAspect="1"/>
+          </p:cNvPicPr>
+          <p:nvPr/>
+        </p:nvPicPr>
+        <p:blipFill>
+          <a:blip r:embed="rId3">
+            <a:extLst>
+              <a:ext uri="{BEBA8EAE-BF5A-486C-A8C5-ECC9F3942E4B}">
+                <a14:imgProps xmlns:a14="http://schemas.microsoft.com/office/drawing/2010/main">
+                  <a14:imgLayer r:embed="rId4">
+                    <a14:imgEffect>
+                      <a14:backgroundRemoval t="0" b="100000" l="0" r="100000"/>
+                    </a14:imgEffect>
+                  </a14:imgLayer>
+                </a14:imgProps>
+              </a:ext>
+            </a:extLst>
+          </a:blip>
+          <a:stretch>
+            <a:fillRect/>
+          </a:stretch>
+        </p:blipFill>
+        <p:spPr>
+          <a:xfrm>
+            <a:off x="5076056" y="1772816"/>
+            <a:ext cx="806492" cy="806492"/>
+          </a:xfrm>
+          <a:prstGeom prst="rect">
+            <a:avLst/>
+          </a:prstGeom>
+        </p:spPr>
+      </p:pic>
+    </p:spTree>
+    <p:extLst>
+      <p:ext uri="{BB962C8B-B14F-4D97-AF65-F5344CB8AC3E}">
+        <p14:creationId xmlns:p14="http://schemas.microsoft.com/office/powerpoint/2010/main" val="3362469657"/>
+      </p:ext>
+    </p:extLst>
+  </p:cSld>
+  <p:clrMapOvr>
+    <a:masterClrMapping/>
+  </p:clrMapOvr>
+</p:sld>
+</file>
+
+<file path=ppt/slides/slide3.xml><?xml version="1.0" encoding="utf-8"?>
 <p:sld xmlns:a="http://schemas.openxmlformats.org/drawingml/2006/main" xmlns:r="http://schemas.openxmlformats.org/officeDocument/2006/relationships" xmlns:p="http://schemas.openxmlformats.org/presentationml/2006/main">
   <p:cSld>
     <p:spTree>

</xml_diff>